<commit_message>
added recommendation to file
</commit_message>
<xml_diff>
--- a/SAGE_GROUP_15.pptx
+++ b/SAGE_GROUP_15.pptx
@@ -15,7 +15,8 @@
     <p:sldId id="265" r:id="rId9"/>
     <p:sldId id="266" r:id="rId10"/>
     <p:sldId id="267" r:id="rId11"/>
-    <p:sldId id="261" r:id="rId12"/>
+    <p:sldId id="268" r:id="rId12"/>
+    <p:sldId id="261" r:id="rId13"/>
   </p:sldIdLst>
   <p:sldSz cx="12192000" cy="6858000"/>
   <p:notesSz cx="6858000" cy="9144000"/>
@@ -114,6 +115,11 @@
       </a:defRPr>
     </a:lvl9pPr>
   </p:defaultTextStyle>
+  <p:extLst>
+    <p:ext uri="{EFAFB233-063F-42B5-8137-9DF3F51BA10A}">
+      <p15:sldGuideLst xmlns:p15="http://schemas.microsoft.com/office/powerpoint/2012/main"/>
+    </p:ext>
+  </p:extLst>
 </p:presentation>
 </file>
 
@@ -839,7 +845,7 @@
           <a:p>
             <a:fld id="{BD88CC01-F8CD-441D-8C71-E6C5004D4F53}" type="datetimeFigureOut">
               <a:rPr lang="en-NG" smtClean="0"/>
-              <a:t>06/09/2024</a:t>
+              <a:t>07/09/2024</a:t>
             </a:fld>
             <a:endParaRPr lang="en-NG"/>
           </a:p>
@@ -1090,7 +1096,7 @@
           <a:p>
             <a:fld id="{BD88CC01-F8CD-441D-8C71-E6C5004D4F53}" type="datetimeFigureOut">
               <a:rPr lang="en-NG" smtClean="0"/>
-              <a:t>06/09/2024</a:t>
+              <a:t>07/09/2024</a:t>
             </a:fld>
             <a:endParaRPr lang="en-NG"/>
           </a:p>
@@ -1404,7 +1410,7 @@
           <a:p>
             <a:fld id="{BD88CC01-F8CD-441D-8C71-E6C5004D4F53}" type="datetimeFigureOut">
               <a:rPr lang="en-NG" smtClean="0"/>
-              <a:t>06/09/2024</a:t>
+              <a:t>07/09/2024</a:t>
             </a:fld>
             <a:endParaRPr lang="en-NG"/>
           </a:p>
@@ -1745,7 +1751,7 @@
           <a:p>
             <a:fld id="{BD88CC01-F8CD-441D-8C71-E6C5004D4F53}" type="datetimeFigureOut">
               <a:rPr lang="en-NG" smtClean="0"/>
-              <a:t>06/09/2024</a:t>
+              <a:t>07/09/2024</a:t>
             </a:fld>
             <a:endParaRPr lang="en-NG"/>
           </a:p>
@@ -2059,7 +2065,7 @@
           <a:p>
             <a:fld id="{BD88CC01-F8CD-441D-8C71-E6C5004D4F53}" type="datetimeFigureOut">
               <a:rPr lang="en-NG" smtClean="0"/>
-              <a:t>06/09/2024</a:t>
+              <a:t>07/09/2024</a:t>
             </a:fld>
             <a:endParaRPr lang="en-NG"/>
           </a:p>
@@ -2452,7 +2458,7 @@
           <a:p>
             <a:fld id="{BD88CC01-F8CD-441D-8C71-E6C5004D4F53}" type="datetimeFigureOut">
               <a:rPr lang="en-NG" smtClean="0"/>
-              <a:t>06/09/2024</a:t>
+              <a:t>07/09/2024</a:t>
             </a:fld>
             <a:endParaRPr lang="en-NG"/>
           </a:p>
@@ -2622,7 +2628,7 @@
           <a:p>
             <a:fld id="{BD88CC01-F8CD-441D-8C71-E6C5004D4F53}" type="datetimeFigureOut">
               <a:rPr lang="en-NG" smtClean="0"/>
-              <a:t>06/09/2024</a:t>
+              <a:t>07/09/2024</a:t>
             </a:fld>
             <a:endParaRPr lang="en-NG"/>
           </a:p>
@@ -2802,7 +2808,7 @@
           <a:p>
             <a:fld id="{BD88CC01-F8CD-441D-8C71-E6C5004D4F53}" type="datetimeFigureOut">
               <a:rPr lang="en-NG" smtClean="0"/>
-              <a:t>06/09/2024</a:t>
+              <a:t>07/09/2024</a:t>
             </a:fld>
             <a:endParaRPr lang="en-NG"/>
           </a:p>
@@ -2978,7 +2984,7 @@
           <a:p>
             <a:fld id="{BD88CC01-F8CD-441D-8C71-E6C5004D4F53}" type="datetimeFigureOut">
               <a:rPr lang="en-NG" smtClean="0"/>
-              <a:t>06/09/2024</a:t>
+              <a:t>07/09/2024</a:t>
             </a:fld>
             <a:endParaRPr lang="en-NG"/>
           </a:p>
@@ -3225,7 +3231,7 @@
           <a:p>
             <a:fld id="{BD88CC01-F8CD-441D-8C71-E6C5004D4F53}" type="datetimeFigureOut">
               <a:rPr lang="en-NG" smtClean="0"/>
-              <a:t>06/09/2024</a:t>
+              <a:t>07/09/2024</a:t>
             </a:fld>
             <a:endParaRPr lang="en-NG"/>
           </a:p>
@@ -3457,7 +3463,7 @@
           <a:p>
             <a:fld id="{BD88CC01-F8CD-441D-8C71-E6C5004D4F53}" type="datetimeFigureOut">
               <a:rPr lang="en-NG" smtClean="0"/>
-              <a:t>06/09/2024</a:t>
+              <a:t>07/09/2024</a:t>
             </a:fld>
             <a:endParaRPr lang="en-NG"/>
           </a:p>
@@ -3831,7 +3837,7 @@
           <a:p>
             <a:fld id="{BD88CC01-F8CD-441D-8C71-E6C5004D4F53}" type="datetimeFigureOut">
               <a:rPr lang="en-NG" smtClean="0"/>
-              <a:t>06/09/2024</a:t>
+              <a:t>07/09/2024</a:t>
             </a:fld>
             <a:endParaRPr lang="en-NG"/>
           </a:p>
@@ -3954,7 +3960,7 @@
           <a:p>
             <a:fld id="{BD88CC01-F8CD-441D-8C71-E6C5004D4F53}" type="datetimeFigureOut">
               <a:rPr lang="en-NG" smtClean="0"/>
-              <a:t>06/09/2024</a:t>
+              <a:t>07/09/2024</a:t>
             </a:fld>
             <a:endParaRPr lang="en-NG"/>
           </a:p>
@@ -4049,7 +4055,7 @@
           <a:p>
             <a:fld id="{BD88CC01-F8CD-441D-8C71-E6C5004D4F53}" type="datetimeFigureOut">
               <a:rPr lang="en-NG" smtClean="0"/>
-              <a:t>06/09/2024</a:t>
+              <a:t>07/09/2024</a:t>
             </a:fld>
             <a:endParaRPr lang="en-NG"/>
           </a:p>
@@ -4304,7 +4310,7 @@
           <a:p>
             <a:fld id="{BD88CC01-F8CD-441D-8C71-E6C5004D4F53}" type="datetimeFigureOut">
               <a:rPr lang="en-NG" smtClean="0"/>
-              <a:t>06/09/2024</a:t>
+              <a:t>07/09/2024</a:t>
             </a:fld>
             <a:endParaRPr lang="en-NG"/>
           </a:p>
@@ -4567,7 +4573,7 @@
           <a:p>
             <a:fld id="{BD88CC01-F8CD-441D-8C71-E6C5004D4F53}" type="datetimeFigureOut">
               <a:rPr lang="en-NG" smtClean="0"/>
-              <a:t>06/09/2024</a:t>
+              <a:t>07/09/2024</a:t>
             </a:fld>
             <a:endParaRPr lang="en-NG"/>
           </a:p>
@@ -5310,7 +5316,7 @@
           <a:p>
             <a:fld id="{BD88CC01-F8CD-441D-8C71-E6C5004D4F53}" type="datetimeFigureOut">
               <a:rPr lang="en-NG" smtClean="0"/>
-              <a:t>06/09/2024</a:t>
+              <a:t>07/09/2024</a:t>
             </a:fld>
             <a:endParaRPr lang="en-NG"/>
           </a:p>
@@ -6237,18 +6243,6 @@
               <a:t>Tia Amato, close behind, has also crossed the $1 million mark, with opportunities for further growth through client retention and upselling. Vernita Plump, generating $934K, is a strong contributor and has the potential to exceed $1 million with targeted strategies. </a:t>
             </a:r>
           </a:p>
-          <a:p>
-            <a:pPr>
-              <a:lnSpc>
-                <a:spcPct val="150000"/>
-              </a:lnSpc>
-            </a:pPr>
-            <a:r>
-              <a:rPr lang="en-US" sz="2400" dirty="0"/>
-              <a:t>All three reps are crucial to the business’s success, and focusing on their key accounts can unlock even more revenue.</a:t>
-            </a:r>
-            <a:endParaRPr lang="en-NG" sz="2400" dirty="0"/>
-          </a:p>
         </p:txBody>
       </p:sp>
     </p:spTree>
@@ -6286,6 +6280,120 @@
           <p:cNvPr id="2" name="Title 1">
             <a:extLst>
               <a:ext uri="{FF2B5EF4-FFF2-40B4-BE49-F238E27FC236}">
+                <a16:creationId xmlns:a16="http://schemas.microsoft.com/office/drawing/2014/main" id="{A4DC2724-B674-9630-FE9B-005F5C43A140}"/>
+              </a:ext>
+            </a:extLst>
+          </p:cNvPr>
+          <p:cNvSpPr>
+            <a:spLocks noGrp="1"/>
+          </p:cNvSpPr>
+          <p:nvPr>
+            <p:ph type="title"/>
+          </p:nvPr>
+        </p:nvSpPr>
+        <p:spPr/>
+        <p:txBody>
+          <a:bodyPr/>
+          <a:lstStyle/>
+          <a:p>
+            <a:r>
+              <a:rPr lang="en-US" dirty="0"/>
+              <a:t>Recommendation</a:t>
+            </a:r>
+            <a:endParaRPr lang="en-NG" dirty="0"/>
+          </a:p>
+        </p:txBody>
+      </p:sp>
+      <p:sp>
+        <p:nvSpPr>
+          <p:cNvPr id="3" name="Content Placeholder 2">
+            <a:extLst>
+              <a:ext uri="{FF2B5EF4-FFF2-40B4-BE49-F238E27FC236}">
+                <a16:creationId xmlns:a16="http://schemas.microsoft.com/office/drawing/2014/main" id="{233F0684-1F2B-9F7B-D735-6D419AEF40E2}"/>
+              </a:ext>
+            </a:extLst>
+          </p:cNvPr>
+          <p:cNvSpPr>
+            <a:spLocks noGrp="1"/>
+          </p:cNvSpPr>
+          <p:nvPr>
+            <p:ph idx="1"/>
+          </p:nvPr>
+        </p:nvSpPr>
+        <p:spPr>
+          <a:xfrm>
+            <a:off x="393895" y="1195755"/>
+            <a:ext cx="11120771" cy="5345722"/>
+          </a:xfrm>
+        </p:spPr>
+        <p:txBody>
+          <a:bodyPr>
+            <a:normAutofit/>
+          </a:bodyPr>
+          <a:lstStyle/>
+          <a:p>
+            <a:pPr>
+              <a:lnSpc>
+                <a:spcPct val="200000"/>
+              </a:lnSpc>
+            </a:pPr>
+            <a:r>
+              <a:rPr lang="en-US" sz="2400" dirty="0"/>
+              <a:t>All three reps are crucial to the business’s success, and focusing on their key accounts can unlock even more revenue. They should also be rewarded with bonuses for motivation an morale boost.</a:t>
+            </a:r>
+          </a:p>
+          <a:p>
+            <a:pPr>
+              <a:lnSpc>
+                <a:spcPct val="200000"/>
+              </a:lnSpc>
+            </a:pPr>
+            <a:r>
+              <a:rPr lang="en-US" sz="2400" dirty="0"/>
+              <a:t> The low revenue yield in the  Midwest should guide resource allocation and marketing focus to maximize revenue across all regions.</a:t>
+            </a:r>
+            <a:endParaRPr lang="en-NG" sz="2400" dirty="0"/>
+          </a:p>
+          <a:p>
+            <a:endParaRPr lang="en-NG" sz="2400" dirty="0"/>
+          </a:p>
+        </p:txBody>
+      </p:sp>
+    </p:spTree>
+    <p:extLst>
+      <p:ext uri="{BB962C8B-B14F-4D97-AF65-F5344CB8AC3E}">
+        <p14:creationId xmlns:p14="http://schemas.microsoft.com/office/powerpoint/2010/main" val="2325832512"/>
+      </p:ext>
+    </p:extLst>
+  </p:cSld>
+  <p:clrMapOvr>
+    <a:masterClrMapping/>
+  </p:clrMapOvr>
+</p:sld>
+</file>
+
+<file path=ppt/slides/slide12.xml><?xml version="1.0" encoding="utf-8"?>
+<p:sld xmlns:a="http://schemas.openxmlformats.org/drawingml/2006/main" xmlns:r="http://schemas.openxmlformats.org/officeDocument/2006/relationships" xmlns:p="http://schemas.openxmlformats.org/presentationml/2006/main">
+  <p:cSld>
+    <p:spTree>
+      <p:nvGrpSpPr>
+        <p:cNvPr id="1" name=""/>
+        <p:cNvGrpSpPr/>
+        <p:nvPr/>
+      </p:nvGrpSpPr>
+      <p:grpSpPr>
+        <a:xfrm>
+          <a:off x="0" y="0"/>
+          <a:ext cx="0" cy="0"/>
+          <a:chOff x="0" y="0"/>
+          <a:chExt cx="0" cy="0"/>
+        </a:xfrm>
+      </p:grpSpPr>
+      <p:sp>
+        <p:nvSpPr>
+          <p:cNvPr id="2" name="Title 1">
+            <a:extLst>
+              <a:ext uri="{FF2B5EF4-FFF2-40B4-BE49-F238E27FC236}">
                 <a16:creationId xmlns:a16="http://schemas.microsoft.com/office/drawing/2014/main" id="{9B3FF7E0-A774-4C0E-8DAC-F14BB318A34F}"/>
               </a:ext>
             </a:extLst>
@@ -6665,7 +6773,7 @@
             </a:pPr>
             <a:r>
               <a:rPr lang="en-US" sz="2800" dirty="0"/>
-              <a:t>What is the average order amount for each of the top two</a:t>
+              <a:t>What is the average order amount for each of the top two product categories. </a:t>
             </a:r>
           </a:p>
           <a:p>
@@ -7102,17 +7210,16 @@
             </a:r>
           </a:p>
           <a:p>
+            <a:pPr marL="0" indent="0">
+              <a:buNone/>
+            </a:pPr>
+            <a:endParaRPr lang="en-US" sz="2400" dirty="0"/>
+          </a:p>
+          <a:p>
             <a:r>
               <a:rPr lang="en-US" sz="2400" dirty="0"/>
               <a:t>The West region, while still substantial at $5.92 million, trails behind the top two regions. Midwest shows the lowest revenue at $3.01 million, suggesting potential for improvement or targeted growth strategies. </a:t>
             </a:r>
-          </a:p>
-          <a:p>
-            <a:r>
-              <a:rPr lang="en-US" sz="2400" dirty="0"/>
-              <a:t>These insights can guide resource allocation and marketing focus to maximize revenue across all regions</a:t>
-            </a:r>
-            <a:endParaRPr lang="en-NG" sz="2400" dirty="0"/>
           </a:p>
         </p:txBody>
       </p:sp>

</xml_diff>